<commit_message>
New Slide Deck version
</commit_message>
<xml_diff>
--- a/Azure Resource Templates Meetup Bonn.pptx
+++ b/Azure Resource Templates Meetup Bonn.pptx
@@ -222,7 +222,7 @@
           <a:p>
             <a:fld id="{1FC3341F-0C55-4C8F-B15B-0191D7D89B5D}" type="datetimeFigureOut">
               <a:rPr lang="de-DE" smtClean="0"/>
-              <a:t>25.02.2018</a:t>
+              <a:t>28.02.2018</a:t>
             </a:fld>
             <a:endParaRPr lang="de-DE"/>
           </a:p>
@@ -1950,6 +1950,42 @@
           <a:chExt cx="0" cy="0"/>
         </a:xfrm>
       </p:grpSpPr>
+      <p:pic>
+        <p:nvPicPr>
+          <p:cNvPr id="8" name="Picture 7" descr="A picture containing toy&#10;&#10;Description generated with high confidence">
+            <a:extLst>
+              <a:ext uri="{FF2B5EF4-FFF2-40B4-BE49-F238E27FC236}">
+                <a16:creationId xmlns:a16="http://schemas.microsoft.com/office/drawing/2014/main" id="{251C8881-55D1-42DC-81B7-70552E57684C}"/>
+              </a:ext>
+            </a:extLst>
+          </p:cNvPr>
+          <p:cNvPicPr>
+            <a:picLocks noChangeAspect="1"/>
+          </p:cNvPicPr>
+          <p:nvPr userDrawn="1"/>
+        </p:nvPicPr>
+        <p:blipFill>
+          <a:blip r:embed="rId2">
+            <a:extLst>
+              <a:ext uri="{28A0092B-C50C-407E-A947-70E740481C1C}">
+                <a14:useLocalDpi xmlns:a14="http://schemas.microsoft.com/office/drawing/2010/main" val="0"/>
+              </a:ext>
+            </a:extLst>
+          </a:blip>
+          <a:stretch>
+            <a:fillRect/>
+          </a:stretch>
+        </p:blipFill>
+        <p:spPr>
+          <a:xfrm>
+            <a:off x="1208116" y="58189"/>
+            <a:ext cx="8848195" cy="6220517"/>
+          </a:xfrm>
+          <a:prstGeom prst="rect">
+            <a:avLst/>
+          </a:prstGeom>
+        </p:spPr>
+      </p:pic>
       <p:sp>
         <p:nvSpPr>
           <p:cNvPr id="3" name="Untertitel 2">
@@ -1963,13 +1999,13 @@
             <a:spLocks noGrp="1"/>
           </p:cNvSpPr>
           <p:nvPr>
-            <p:ph type="subTitle" idx="1"/>
+            <p:ph type="subTitle" idx="1" hasCustomPrompt="1"/>
           </p:nvPr>
         </p:nvSpPr>
         <p:spPr>
           <a:xfrm>
-            <a:off x="1524000" y="4350184"/>
-            <a:ext cx="9144000" cy="1655762"/>
+            <a:off x="4038600" y="2970271"/>
+            <a:ext cx="4114800" cy="1655762"/>
           </a:xfrm>
         </p:spPr>
         <p:txBody>
@@ -1977,7 +2013,11 @@
           <a:lstStyle>
             <a:lvl1pPr marL="0" indent="0" algn="ctr">
               <a:buNone/>
-              <a:defRPr sz="2400"/>
+              <a:defRPr sz="2400">
+                <a:solidFill>
+                  <a:srgbClr val="555555"/>
+                </a:solidFill>
+              </a:defRPr>
             </a:lvl1pPr>
             <a:lvl2pPr marL="457200" indent="0" algn="ctr">
               <a:buNone/>
@@ -2014,8 +2054,8 @@
           </a:lstStyle>
           <a:p>
             <a:r>
-              <a:rPr lang="en-US"/>
-              <a:t>Click to edit Master subtitle style</a:t>
+              <a:rPr lang="en-US" dirty="0"/>
+              <a:t>Azure IaaS Resource Template Deployment</a:t>
             </a:r>
             <a:endParaRPr lang="de-DE" dirty="0"/>
           </a:p>
@@ -2044,7 +2084,7 @@
           <a:p>
             <a:fld id="{EF617A4E-D3F1-4F1D-A735-6FDB733985F3}" type="datetime1">
               <a:rPr lang="de-DE" smtClean="0"/>
-              <a:t>25.02.2018</a:t>
+              <a:t>28.02.2018</a:t>
             </a:fld>
             <a:endParaRPr lang="de-DE" dirty="0"/>
           </a:p>
@@ -2124,42 +2164,6 @@
           </a:p>
         </p:txBody>
       </p:sp>
-      <p:pic>
-        <p:nvPicPr>
-          <p:cNvPr id="7" name="Picture 6" descr="A close up of a sign&#10;&#10;Description generated with very high confidence">
-            <a:extLst>
-              <a:ext uri="{FF2B5EF4-FFF2-40B4-BE49-F238E27FC236}">
-                <a16:creationId xmlns:a16="http://schemas.microsoft.com/office/drawing/2014/main" id="{41D3B67A-DBB6-4D4A-A62B-F23B34181AA3}"/>
-              </a:ext>
-            </a:extLst>
-          </p:cNvPr>
-          <p:cNvPicPr>
-            <a:picLocks noChangeAspect="1"/>
-          </p:cNvPicPr>
-          <p:nvPr userDrawn="1"/>
-        </p:nvPicPr>
-        <p:blipFill>
-          <a:blip r:embed="rId2">
-            <a:extLst>
-              <a:ext uri="{28A0092B-C50C-407E-A947-70E740481C1C}">
-                <a14:useLocalDpi xmlns:a14="http://schemas.microsoft.com/office/drawing/2010/main" val="0"/>
-              </a:ext>
-            </a:extLst>
-          </a:blip>
-          <a:stretch>
-            <a:fillRect/>
-          </a:stretch>
-        </p:blipFill>
-        <p:spPr>
-          <a:xfrm>
-            <a:off x="2781780" y="1093087"/>
-            <a:ext cx="6628440" cy="3415038"/>
-          </a:xfrm>
-          <a:prstGeom prst="rect">
-            <a:avLst/>
-          </a:prstGeom>
-        </p:spPr>
-      </p:pic>
     </p:spTree>
     <p:extLst>
       <p:ext uri="{BB962C8B-B14F-4D97-AF65-F5344CB8AC3E}">
@@ -2393,7 +2397,7 @@
           <a:p>
             <a:fld id="{6FF1D10D-9FE0-4781-A466-F943D1D5EDF3}" type="datetime1">
               <a:rPr lang="de-DE" smtClean="0"/>
-              <a:t>25.02.2018</a:t>
+              <a:t>28.02.2018</a:t>
             </a:fld>
             <a:endParaRPr lang="de-DE"/>
           </a:p>
@@ -2596,7 +2600,7 @@
           <a:p>
             <a:fld id="{20FA97AD-D0DD-468C-8962-6F6139B2CB67}" type="datetime1">
               <a:rPr lang="de-DE" smtClean="0"/>
-              <a:t>25.02.2018</a:t>
+              <a:t>28.02.2018</a:t>
             </a:fld>
             <a:endParaRPr lang="de-DE"/>
           </a:p>
@@ -2923,7 +2927,7 @@
             <a:fld id="{511110B1-5D0A-49F0-9940-964C42EA8456}" type="datetime1">
               <a:rPr lang="de-DE" smtClean="0"/>
               <a:pPr/>
-              <a:t>25.02.2018</a:t>
+              <a:t>28.02.2018</a:t>
             </a:fld>
             <a:endParaRPr lang="de-DE" dirty="0"/>
           </a:p>
@@ -3413,7 +3417,7 @@
           <a:p>
             <a:fld id="{93F60345-1EA2-4B69-B767-E525A3C2A026}" type="datetime1">
               <a:rPr lang="de-DE" smtClean="0"/>
-              <a:t>25.02.2018</a:t>
+              <a:t>28.02.2018</a:t>
             </a:fld>
             <a:endParaRPr lang="de-DE"/>
           </a:p>
@@ -3728,7 +3732,7 @@
           <a:p>
             <a:fld id="{C52CB2D1-97A0-42A9-9D97-BD4889C5B434}" type="datetime1">
               <a:rPr lang="de-DE" smtClean="0"/>
-              <a:t>25.02.2018</a:t>
+              <a:t>28.02.2018</a:t>
             </a:fld>
             <a:endParaRPr lang="de-DE"/>
           </a:p>
@@ -3999,7 +4003,7 @@
           <a:p>
             <a:fld id="{E42E2172-073E-4F12-B886-B43846F0DF2F}" type="datetime1">
               <a:rPr lang="de-DE" smtClean="0"/>
-              <a:t>25.02.2018</a:t>
+              <a:t>28.02.2018</a:t>
             </a:fld>
             <a:endParaRPr lang="de-DE"/>
           </a:p>
@@ -4453,7 +4457,7 @@
           <a:p>
             <a:fld id="{BF7DAA22-8B0C-45B6-B1DF-56C5DBA5AFF7}" type="datetime1">
               <a:rPr lang="de-DE" smtClean="0"/>
-              <a:t>25.02.2018</a:t>
+              <a:t>28.02.2018</a:t>
             </a:fld>
             <a:endParaRPr lang="de-DE"/>
           </a:p>
@@ -4634,7 +4638,7 @@
           <a:p>
             <a:fld id="{E8E521B9-21AD-4309-B7CF-0B27FD850F88}" type="datetime1">
               <a:rPr lang="de-DE" smtClean="0"/>
-              <a:t>25.02.2018</a:t>
+              <a:t>28.02.2018</a:t>
             </a:fld>
             <a:endParaRPr lang="de-DE"/>
           </a:p>
@@ -4786,7 +4790,7 @@
           <a:p>
             <a:fld id="{FE3C7DAE-D66A-4092-B86F-77D15F07C7E4}" type="datetime1">
               <a:rPr lang="de-DE" smtClean="0"/>
-              <a:t>25.02.2018</a:t>
+              <a:t>28.02.2018</a:t>
             </a:fld>
             <a:endParaRPr lang="de-DE"/>
           </a:p>
@@ -5102,7 +5106,7 @@
           <a:p>
             <a:fld id="{2B8383A9-53B2-43BD-8D6F-6423125336B7}" type="datetime1">
               <a:rPr lang="de-DE" smtClean="0"/>
-              <a:t>25.02.2018</a:t>
+              <a:t>28.02.2018</a:t>
             </a:fld>
             <a:endParaRPr lang="de-DE"/>
           </a:p>
@@ -5433,7 +5437,7 @@
             <a:fld id="{511110B1-5D0A-49F0-9940-964C42EA8456}" type="datetime1">
               <a:rPr lang="de-DE" smtClean="0"/>
               <a:pPr/>
-              <a:t>25.02.2018</a:t>
+              <a:t>28.02.2018</a:t>
             </a:fld>
             <a:endParaRPr lang="de-DE" dirty="0"/>
           </a:p>
@@ -5875,14 +5879,19 @@
             <p:ph type="subTitle" idx="1"/>
           </p:nvPr>
         </p:nvSpPr>
-        <p:spPr/>
+        <p:spPr>
+          <a:xfrm>
+            <a:off x="4038600" y="3188385"/>
+            <a:ext cx="4114800" cy="1655762"/>
+          </a:xfrm>
+        </p:spPr>
         <p:txBody>
           <a:bodyPr/>
           <a:lstStyle/>
           <a:p>
             <a:r>
               <a:rPr lang="en-US" dirty="0"/>
-              <a:t>Azure Resource Template Tricks</a:t>
+              <a:t>Azure IaaS Resource Template Tricks</a:t>
             </a:r>
           </a:p>
         </p:txBody>
@@ -9250,7 +9259,12 @@
             <p:ph type="title"/>
           </p:nvPr>
         </p:nvSpPr>
-        <p:spPr/>
+        <p:spPr>
+          <a:xfrm>
+            <a:off x="838200" y="365125"/>
+            <a:ext cx="7517524" cy="1325563"/>
+          </a:xfrm>
+        </p:spPr>
         <p:txBody>
           <a:bodyPr/>
           <a:lstStyle/>
@@ -9286,7 +9300,7 @@
           <a:p>
             <a:r>
               <a:rPr lang="de-DE" dirty="0"/>
-              <a:t>Azure Infrastructure </a:t>
+              <a:t>Azure IaaS </a:t>
             </a:r>
             <a:r>
               <a:rPr lang="de-DE" dirty="0" err="1"/>
@@ -9344,7 +9358,7 @@
         </p:nvSpPr>
         <p:spPr bwMode="auto">
           <a:xfrm>
-            <a:off x="5943600" y="3821885"/>
+            <a:off x="5943600" y="3586993"/>
             <a:ext cx="304800" cy="304800"/>
           </a:xfrm>
           <a:prstGeom prst="rect">
@@ -9401,7 +9415,7 @@
         </p:blipFill>
         <p:spPr>
           <a:xfrm>
-            <a:off x="838200" y="2346385"/>
+            <a:off x="838200" y="2111493"/>
             <a:ext cx="857250" cy="857250"/>
           </a:xfrm>
           <a:prstGeom prst="rect">
@@ -9423,7 +9437,7 @@
         </p:nvSpPr>
         <p:spPr>
           <a:xfrm>
-            <a:off x="1866121" y="2514672"/>
+            <a:off x="1866121" y="2279780"/>
             <a:ext cx="3853543" cy="584775"/>
           </a:xfrm>
           <a:prstGeom prst="rect">
@@ -9473,7 +9487,7 @@
         </p:blipFill>
         <p:spPr>
           <a:xfrm>
-            <a:off x="781050" y="3517085"/>
+            <a:off x="781050" y="3282193"/>
             <a:ext cx="914400" cy="914400"/>
           </a:xfrm>
           <a:prstGeom prst="rect">
@@ -9495,7 +9509,7 @@
         </p:nvSpPr>
         <p:spPr>
           <a:xfrm>
-            <a:off x="1866121" y="3681897"/>
+            <a:off x="1866121" y="3447005"/>
             <a:ext cx="9697522" cy="584775"/>
           </a:xfrm>
           <a:prstGeom prst="rect">
@@ -9519,7 +9533,7 @@
             </a:r>
             <a:r>
               <a:rPr lang="en-US" sz="3200" dirty="0"/>
-              <a:t> Module – Install-Module Azure</a:t>
+              <a:t> Module</a:t>
             </a:r>
             <a:endParaRPr lang="en-GB" sz="3200" dirty="0"/>
           </a:p>
@@ -9553,7 +9567,7 @@
         </p:blipFill>
         <p:spPr>
           <a:xfrm>
-            <a:off x="781051" y="4846797"/>
+            <a:off x="781051" y="4611905"/>
             <a:ext cx="2447342" cy="1019726"/>
           </a:xfrm>
           <a:prstGeom prst="rect">
@@ -9583,8 +9597,8 @@
         </p:blipFill>
         <p:spPr>
           <a:xfrm>
-            <a:off x="5795887" y="2245658"/>
-            <a:ext cx="4601217" cy="1228896"/>
+            <a:off x="6962426" y="2111493"/>
+            <a:ext cx="3853543" cy="1029207"/>
           </a:xfrm>
           <a:prstGeom prst="rect">
             <a:avLst/>
@@ -9593,42 +9607,237 @@
       </p:pic>
       <p:sp>
         <p:nvSpPr>
-          <p:cNvPr id="24" name="TextBox 23">
-            <a:extLst>
-              <a:ext uri="{FF2B5EF4-FFF2-40B4-BE49-F238E27FC236}">
-                <a16:creationId xmlns:a16="http://schemas.microsoft.com/office/drawing/2014/main" id="{769CCBDF-E906-4723-8D91-25568A860274}"/>
-              </a:ext>
-            </a:extLst>
-          </p:cNvPr>
-          <p:cNvSpPr txBox="1"/>
+          <p:cNvPr id="6" name="Rectangle 1">
+            <a:extLst>
+              <a:ext uri="{FF2B5EF4-FFF2-40B4-BE49-F238E27FC236}">
+                <a16:creationId xmlns:a16="http://schemas.microsoft.com/office/drawing/2014/main" id="{8267ED8A-5DE3-4DA8-848A-6FD89A11E301}"/>
+              </a:ext>
+            </a:extLst>
+          </p:cNvPr>
+          <p:cNvSpPr>
+            <a:spLocks noChangeArrowheads="1"/>
+          </p:cNvSpPr>
           <p:nvPr/>
         </p:nvSpPr>
-        <p:spPr>
-          <a:xfrm>
-            <a:off x="6169723" y="1886357"/>
-            <a:ext cx="3853543" cy="400110"/>
+        <p:spPr bwMode="auto">
+          <a:xfrm>
+            <a:off x="6962426" y="3374190"/>
+            <a:ext cx="3020473" cy="738664"/>
           </a:xfrm>
           <a:prstGeom prst="rect">
             <a:avLst/>
           </a:prstGeom>
-          <a:noFill/>
-        </p:spPr>
-        <p:txBody>
-          <a:bodyPr wrap="square" rtlCol="0">
+          <a:solidFill>
+            <a:schemeClr val="accent1">
+              <a:lumMod val="75000"/>
+            </a:schemeClr>
+          </a:solidFill>
+          <a:ln>
+            <a:noFill/>
+          </a:ln>
+          <a:effectLst/>
+        </p:spPr>
+        <p:txBody>
+          <a:bodyPr vert="horz" wrap="square" lIns="91440" tIns="0" rIns="91440" bIns="0" numCol="1" anchor="ctr" anchorCtr="0" compatLnSpc="1">
+            <a:prstTxWarp prst="textNoShape">
+              <a:avLst/>
+            </a:prstTxWarp>
             <a:spAutoFit/>
           </a:bodyPr>
           <a:lstStyle/>
           <a:p>
-            <a:pPr algn="ctr"/>
-            <a:r>
-              <a:rPr lang="en-US" sz="2000" dirty="0" err="1"/>
-              <a:t>Vscode</a:t>
-            </a:r>
-            <a:r>
-              <a:rPr lang="en-US" sz="2000" dirty="0"/>
-              <a:t> extensions</a:t>
-            </a:r>
-            <a:endParaRPr lang="en-GB" sz="2000" dirty="0"/>
+            <a:pPr lvl="0" eaLnBrk="0" fontAlgn="base" hangingPunct="0">
+              <a:spcBef>
+                <a:spcPct val="0"/>
+              </a:spcBef>
+              <a:spcAft>
+                <a:spcPct val="0"/>
+              </a:spcAft>
+            </a:pPr>
+            <a:endParaRPr kumimoji="0" lang="en-US" altLang="en-US" sz="900" b="0" i="0" u="none" strike="noStrike" cap="none" normalizeH="0" baseline="0" dirty="0">
+              <a:ln>
+                <a:noFill/>
+              </a:ln>
+              <a:solidFill>
+                <a:schemeClr val="bg1"/>
+              </a:solidFill>
+              <a:effectLst/>
+              <a:latin typeface="SFMono-Regular"/>
+            </a:endParaRPr>
+          </a:p>
+          <a:p>
+            <a:pPr lvl="0" eaLnBrk="0" fontAlgn="base" hangingPunct="0">
+              <a:spcBef>
+                <a:spcPct val="0"/>
+              </a:spcBef>
+              <a:spcAft>
+                <a:spcPct val="0"/>
+              </a:spcAft>
+            </a:pPr>
+            <a:endParaRPr lang="en-US" altLang="en-US" sz="900" dirty="0">
+              <a:solidFill>
+                <a:schemeClr val="bg1"/>
+              </a:solidFill>
+              <a:latin typeface="SFMono-Regular"/>
+            </a:endParaRPr>
+          </a:p>
+          <a:p>
+            <a:pPr lvl="0" eaLnBrk="0" fontAlgn="base" hangingPunct="0">
+              <a:spcBef>
+                <a:spcPct val="0"/>
+              </a:spcBef>
+              <a:spcAft>
+                <a:spcPct val="0"/>
+              </a:spcAft>
+            </a:pPr>
+            <a:r>
+              <a:rPr kumimoji="0" lang="en-US" altLang="en-US" sz="1200" b="0" i="0" u="none" strike="noStrike" cap="none" normalizeH="0" baseline="0" dirty="0">
+                <a:ln>
+                  <a:noFill/>
+                </a:ln>
+                <a:solidFill>
+                  <a:schemeClr val="bg1"/>
+                </a:solidFill>
+                <a:effectLst/>
+                <a:latin typeface="SFMono-Regular"/>
+              </a:rPr>
+              <a:t>PS </a:t>
+            </a:r>
+            <a:r>
+              <a:rPr lang="en-US" altLang="en-US" sz="1200" dirty="0">
+                <a:solidFill>
+                  <a:schemeClr val="bg1"/>
+                </a:solidFill>
+                <a:latin typeface="SFMono-Regular"/>
+              </a:rPr>
+              <a:t>&gt; </a:t>
+            </a:r>
+            <a:r>
+              <a:rPr lang="en-US" altLang="en-US" sz="1200" dirty="0">
+                <a:solidFill>
+                  <a:srgbClr val="FFFF00"/>
+                </a:solidFill>
+                <a:latin typeface="SFMono-Regular"/>
+              </a:rPr>
+              <a:t>Install-Module</a:t>
+            </a:r>
+            <a:r>
+              <a:rPr lang="en-US" altLang="en-US" sz="1200" dirty="0">
+                <a:solidFill>
+                  <a:srgbClr val="032F62"/>
+                </a:solidFill>
+                <a:latin typeface="SFMono-Regular"/>
+              </a:rPr>
+              <a:t> </a:t>
+            </a:r>
+            <a:r>
+              <a:rPr lang="en-US" altLang="en-US" sz="1200" dirty="0">
+                <a:solidFill>
+                  <a:schemeClr val="bg1"/>
+                </a:solidFill>
+                <a:latin typeface="SFMono-Regular"/>
+              </a:rPr>
+              <a:t>Azure</a:t>
+            </a:r>
+            <a:r>
+              <a:rPr lang="en-US" altLang="en-US" sz="1200" dirty="0">
+                <a:solidFill>
+                  <a:srgbClr val="032F62"/>
+                </a:solidFill>
+                <a:latin typeface="SFMono-Regular"/>
+              </a:rPr>
+              <a:t> </a:t>
+            </a:r>
+            <a:r>
+              <a:rPr lang="en-US" altLang="en-US" sz="1200" dirty="0">
+                <a:solidFill>
+                  <a:schemeClr val="bg2">
+                    <a:lumMod val="75000"/>
+                  </a:schemeClr>
+                </a:solidFill>
+                <a:latin typeface="SFMono-Regular"/>
+              </a:rPr>
+              <a:t>–</a:t>
+            </a:r>
+            <a:r>
+              <a:rPr lang="en-US" altLang="en-US" sz="1200" dirty="0" err="1">
+                <a:solidFill>
+                  <a:schemeClr val="bg2">
+                    <a:lumMod val="75000"/>
+                  </a:schemeClr>
+                </a:solidFill>
+                <a:latin typeface="SFMono-Regular"/>
+              </a:rPr>
+              <a:t>AllowClobber</a:t>
+            </a:r>
+            <a:endParaRPr lang="en-US" altLang="en-US" sz="1200" dirty="0">
+              <a:solidFill>
+                <a:schemeClr val="bg2">
+                  <a:lumMod val="75000"/>
+                </a:schemeClr>
+              </a:solidFill>
+              <a:latin typeface="SFMono-Regular"/>
+            </a:endParaRPr>
+          </a:p>
+          <a:p>
+            <a:pPr lvl="0" eaLnBrk="0" fontAlgn="base" hangingPunct="0">
+              <a:spcBef>
+                <a:spcPct val="0"/>
+              </a:spcBef>
+              <a:spcAft>
+                <a:spcPct val="0"/>
+              </a:spcAft>
+            </a:pPr>
+            <a:endParaRPr kumimoji="0" lang="en-US" altLang="en-US" sz="1800" b="0" i="0" u="none" strike="noStrike" cap="none" normalizeH="0" baseline="0" dirty="0">
+              <a:ln>
+                <a:noFill/>
+              </a:ln>
+              <a:solidFill>
+                <a:schemeClr val="tx1">
+                  <a:lumMod val="50000"/>
+                  <a:lumOff val="50000"/>
+                </a:schemeClr>
+              </a:solidFill>
+              <a:effectLst/>
+              <a:latin typeface="Arial" panose="020B0604020202020204" pitchFamily="34" charset="0"/>
+            </a:endParaRPr>
+          </a:p>
+        </p:txBody>
+      </p:sp>
+      <p:sp>
+        <p:nvSpPr>
+          <p:cNvPr id="7" name="Rectangle 6">
+            <a:extLst>
+              <a:ext uri="{FF2B5EF4-FFF2-40B4-BE49-F238E27FC236}">
+                <a16:creationId xmlns:a16="http://schemas.microsoft.com/office/drawing/2014/main" id="{61655075-3270-495E-83BC-DCE1F6F35BF1}"/>
+              </a:ext>
+            </a:extLst>
+          </p:cNvPr>
+          <p:cNvSpPr/>
+          <p:nvPr/>
+        </p:nvSpPr>
+        <p:spPr>
+          <a:xfrm>
+            <a:off x="6962426" y="4937102"/>
+            <a:ext cx="3389261" cy="369332"/>
+          </a:xfrm>
+          <a:prstGeom prst="rect">
+            <a:avLst/>
+          </a:prstGeom>
+        </p:spPr>
+        <p:txBody>
+          <a:bodyPr wrap="none">
+            <a:spAutoFit/>
+          </a:bodyPr>
+          <a:lstStyle/>
+          <a:p>
+            <a:r>
+              <a:rPr lang="en-US" dirty="0">
+                <a:hlinkClick r:id="rId7"/>
+              </a:rPr>
+              <a:t>https://git-scm.com/downloads</a:t>
+            </a:r>
+            <a:endParaRPr lang="en-US" dirty="0"/>
           </a:p>
         </p:txBody>
       </p:sp>
@@ -13137,15 +13346,6 @@
 </file>
 
 <file path=customXml/item1.xml><?xml version="1.0" encoding="utf-8"?>
-<?mso-contentType ?>
-<FormTemplates xmlns="http://schemas.microsoft.com/sharepoint/v3/contenttype/forms">
-  <Display>DocumentLibraryForm</Display>
-  <Edit>DocumentLibraryForm</Edit>
-  <New>DocumentLibraryForm</New>
-</FormTemplates>
-</file>
-
-<file path=customXml/item2.xml><?xml version="1.0" encoding="utf-8"?>
 <ct:contentTypeSchema xmlns:ct="http://schemas.microsoft.com/office/2006/metadata/contentType" xmlns:ma="http://schemas.microsoft.com/office/2006/metadata/properties/metaAttributes" ct:_="" ma:_="" ma:contentTypeName="Document" ma:contentTypeID="0x0101001F112F312FB99D4C8C85E3CAD0E55F42" ma:contentTypeVersion="4" ma:contentTypeDescription="Create a new document." ma:contentTypeScope="" ma:versionID="ec48e5751b103e566fe3d559e8dd9e2b">
   <xsd:schema xmlns:xsd="http://www.w3.org/2001/XMLSchema" xmlns:xs="http://www.w3.org/2001/XMLSchema" xmlns:p="http://schemas.microsoft.com/office/2006/metadata/properties" xmlns:ns2="d852a3fa-7f53-4bce-9e2d-7f4925209575" targetNamespace="http://schemas.microsoft.com/office/2006/metadata/properties" ma:root="true" ma:fieldsID="5d73d0c807f4727bdee2e942b5c886d3" ns2:_="">
     <xsd:import namespace="d852a3fa-7f53-4bce-9e2d-7f4925209575"/>
@@ -13291,21 +13491,22 @@
 </ct:contentTypeSchema>
 </file>
 
-<file path=customXml/item3.xml><?xml version="1.0" encoding="utf-8"?>
+<file path=customXml/item2.xml><?xml version="1.0" encoding="utf-8"?>
 <p:properties xmlns:p="http://schemas.microsoft.com/office/2006/metadata/properties" xmlns:xsi="http://www.w3.org/2001/XMLSchema-instance" xmlns:pc="http://schemas.microsoft.com/office/infopath/2007/PartnerControls">
   <documentManagement/>
 </p:properties>
 </file>
 
-<file path=customXml/itemProps1.xml><?xml version="1.0" encoding="utf-8"?>
-<ds:datastoreItem xmlns:ds="http://schemas.openxmlformats.org/officeDocument/2006/customXml" ds:itemID="{AB651D1B-557D-4042-BC35-EFEC30942A2C}">
-  <ds:schemaRefs>
-    <ds:schemaRef ds:uri="http://schemas.microsoft.com/sharepoint/v3/contenttype/forms"/>
-  </ds:schemaRefs>
-</ds:datastoreItem>
+<file path=customXml/item3.xml><?xml version="1.0" encoding="utf-8"?>
+<?mso-contentType ?>
+<FormTemplates xmlns="http://schemas.microsoft.com/sharepoint/v3/contenttype/forms">
+  <Display>DocumentLibraryForm</Display>
+  <Edit>DocumentLibraryForm</Edit>
+  <New>DocumentLibraryForm</New>
+</FormTemplates>
 </file>
 
-<file path=customXml/itemProps2.xml><?xml version="1.0" encoding="utf-8"?>
+<file path=customXml/itemProps1.xml><?xml version="1.0" encoding="utf-8"?>
 <ds:datastoreItem xmlns:ds="http://schemas.openxmlformats.org/officeDocument/2006/customXml" ds:itemID="{2A9F5563-62DB-4324-9FCF-4BA7D8C0532C}">
   <ds:schemaRefs>
     <ds:schemaRef ds:uri="http://schemas.microsoft.com/office/2006/metadata/contentType"/>
@@ -13323,18 +13524,26 @@
 </ds:datastoreItem>
 </file>
 
-<file path=customXml/itemProps3.xml><?xml version="1.0" encoding="utf-8"?>
+<file path=customXml/itemProps2.xml><?xml version="1.0" encoding="utf-8"?>
 <ds:datastoreItem xmlns:ds="http://schemas.openxmlformats.org/officeDocument/2006/customXml" ds:itemID="{A2CB66C7-C0EB-4429-BE19-E9C9E3FB02EF}">
   <ds:schemaRefs>
+    <ds:schemaRef ds:uri="http://schemas.microsoft.com/office/2006/metadata/properties"/>
+    <ds:schemaRef ds:uri="d852a3fa-7f53-4bce-9e2d-7f4925209575"/>
     <ds:schemaRef ds:uri="http://schemas.microsoft.com/office/2006/documentManagement/types"/>
+    <ds:schemaRef ds:uri="http://schemas.openxmlformats.org/package/2006/metadata/core-properties"/>
+    <ds:schemaRef ds:uri="http://purl.org/dc/dcmitype/"/>
+    <ds:schemaRef ds:uri="http://schemas.microsoft.com/office/infopath/2007/PartnerControls"/>
     <ds:schemaRef ds:uri="http://purl.org/dc/elements/1.1/"/>
-    <ds:schemaRef ds:uri="d852a3fa-7f53-4bce-9e2d-7f4925209575"/>
+    <ds:schemaRef ds:uri="http://www.w3.org/XML/1998/namespace"/>
     <ds:schemaRef ds:uri="http://purl.org/dc/terms/"/>
-    <ds:schemaRef ds:uri="http://schemas.microsoft.com/office/2006/metadata/properties"/>
-    <ds:schemaRef ds:uri="http://schemas.microsoft.com/office/infopath/2007/PartnerControls"/>
-    <ds:schemaRef ds:uri="http://schemas.openxmlformats.org/package/2006/metadata/core-properties"/>
-    <ds:schemaRef ds:uri="http://www.w3.org/XML/1998/namespace"/>
-    <ds:schemaRef ds:uri="http://purl.org/dc/dcmitype/"/>
+  </ds:schemaRefs>
+</ds:datastoreItem>
+</file>
+
+<file path=customXml/itemProps3.xml><?xml version="1.0" encoding="utf-8"?>
+<ds:datastoreItem xmlns:ds="http://schemas.openxmlformats.org/officeDocument/2006/customXml" ds:itemID="{AB651D1B-557D-4042-BC35-EFEC30942A2C}">
+  <ds:schemaRefs>
+    <ds:schemaRef ds:uri="http://schemas.microsoft.com/sharepoint/v3/contenttype/forms"/>
   </ds:schemaRefs>
 </ds:datastoreItem>
 </file>
</xml_diff>